<commit_message>
DB Edit & design PPT
 DB Edit & design PPT
</commit_message>
<xml_diff>
--- a/설계서.pptx
+++ b/설계서.pptx
@@ -216,7 +216,7 @@
           <a:p>
             <a:fld id="{8DBFF32E-A26D-429E-B1A2-9D0633C064F1}" type="datetimeFigureOut">
               <a:rPr lang="ko-KR" altLang="en-US" smtClean="0"/>
-              <a:t>2024-10-27</a:t>
+              <a:t>2024-10-28</a:t>
             </a:fld>
             <a:endParaRPr lang="ko-KR" altLang="en-US"/>
           </a:p>
@@ -612,7 +612,7 @@
           <a:p>
             <a:fld id="{C7351A05-FE79-4763-A84F-D4FE701A9E82}" type="datetimeFigureOut">
               <a:rPr lang="ko-KR" altLang="en-US" smtClean="0"/>
-              <a:t>2024-10-27</a:t>
+              <a:t>2024-10-28</a:t>
             </a:fld>
             <a:endParaRPr lang="ko-KR" altLang="en-US"/>
           </a:p>
@@ -780,7 +780,7 @@
           <a:p>
             <a:fld id="{C7351A05-FE79-4763-A84F-D4FE701A9E82}" type="datetimeFigureOut">
               <a:rPr lang="ko-KR" altLang="en-US" smtClean="0"/>
-              <a:t>2024-10-27</a:t>
+              <a:t>2024-10-28</a:t>
             </a:fld>
             <a:endParaRPr lang="ko-KR" altLang="en-US"/>
           </a:p>
@@ -958,7 +958,7 @@
           <a:p>
             <a:fld id="{C7351A05-FE79-4763-A84F-D4FE701A9E82}" type="datetimeFigureOut">
               <a:rPr lang="ko-KR" altLang="en-US" smtClean="0"/>
-              <a:t>2024-10-27</a:t>
+              <a:t>2024-10-28</a:t>
             </a:fld>
             <a:endParaRPr lang="ko-KR" altLang="en-US"/>
           </a:p>
@@ -1126,7 +1126,7 @@
           <a:p>
             <a:fld id="{C7351A05-FE79-4763-A84F-D4FE701A9E82}" type="datetimeFigureOut">
               <a:rPr lang="ko-KR" altLang="en-US" smtClean="0"/>
-              <a:t>2024-10-27</a:t>
+              <a:t>2024-10-28</a:t>
             </a:fld>
             <a:endParaRPr lang="ko-KR" altLang="en-US"/>
           </a:p>
@@ -1371,7 +1371,7 @@
           <a:p>
             <a:fld id="{C7351A05-FE79-4763-A84F-D4FE701A9E82}" type="datetimeFigureOut">
               <a:rPr lang="ko-KR" altLang="en-US" smtClean="0"/>
-              <a:t>2024-10-27</a:t>
+              <a:t>2024-10-28</a:t>
             </a:fld>
             <a:endParaRPr lang="ko-KR" altLang="en-US"/>
           </a:p>
@@ -1600,7 +1600,7 @@
           <a:p>
             <a:fld id="{C7351A05-FE79-4763-A84F-D4FE701A9E82}" type="datetimeFigureOut">
               <a:rPr lang="ko-KR" altLang="en-US" smtClean="0"/>
-              <a:t>2024-10-27</a:t>
+              <a:t>2024-10-28</a:t>
             </a:fld>
             <a:endParaRPr lang="ko-KR" altLang="en-US"/>
           </a:p>
@@ -1964,7 +1964,7 @@
           <a:p>
             <a:fld id="{C7351A05-FE79-4763-A84F-D4FE701A9E82}" type="datetimeFigureOut">
               <a:rPr lang="ko-KR" altLang="en-US" smtClean="0"/>
-              <a:t>2024-10-27</a:t>
+              <a:t>2024-10-28</a:t>
             </a:fld>
             <a:endParaRPr lang="ko-KR" altLang="en-US"/>
           </a:p>
@@ -2081,7 +2081,7 @@
           <a:p>
             <a:fld id="{C7351A05-FE79-4763-A84F-D4FE701A9E82}" type="datetimeFigureOut">
               <a:rPr lang="ko-KR" altLang="en-US" smtClean="0"/>
-              <a:t>2024-10-27</a:t>
+              <a:t>2024-10-28</a:t>
             </a:fld>
             <a:endParaRPr lang="ko-KR" altLang="en-US"/>
           </a:p>
@@ -2176,7 +2176,7 @@
           <a:p>
             <a:fld id="{C7351A05-FE79-4763-A84F-D4FE701A9E82}" type="datetimeFigureOut">
               <a:rPr lang="ko-KR" altLang="en-US" smtClean="0"/>
-              <a:t>2024-10-27</a:t>
+              <a:t>2024-10-28</a:t>
             </a:fld>
             <a:endParaRPr lang="ko-KR" altLang="en-US"/>
           </a:p>
@@ -2451,7 +2451,7 @@
           <a:p>
             <a:fld id="{C7351A05-FE79-4763-A84F-D4FE701A9E82}" type="datetimeFigureOut">
               <a:rPr lang="ko-KR" altLang="en-US" smtClean="0"/>
-              <a:t>2024-10-27</a:t>
+              <a:t>2024-10-28</a:t>
             </a:fld>
             <a:endParaRPr lang="ko-KR" altLang="en-US"/>
           </a:p>
@@ -2703,7 +2703,7 @@
           <a:p>
             <a:fld id="{C7351A05-FE79-4763-A84F-D4FE701A9E82}" type="datetimeFigureOut">
               <a:rPr lang="ko-KR" altLang="en-US" smtClean="0"/>
-              <a:t>2024-10-27</a:t>
+              <a:t>2024-10-28</a:t>
             </a:fld>
             <a:endParaRPr lang="ko-KR" altLang="en-US"/>
           </a:p>
@@ -2914,7 +2914,7 @@
           <a:p>
             <a:fld id="{C7351A05-FE79-4763-A84F-D4FE701A9E82}" type="datetimeFigureOut">
               <a:rPr lang="ko-KR" altLang="en-US" smtClean="0"/>
-              <a:t>2024-10-27</a:t>
+              <a:t>2024-10-28</a:t>
             </a:fld>
             <a:endParaRPr lang="ko-KR" altLang="en-US"/>
           </a:p>
@@ -11931,10 +11931,10 @@
       </p:sp>
       <p:pic>
         <p:nvPicPr>
-          <p:cNvPr id="5" name="그림 4">
+          <p:cNvPr id="4" name="그림 3">
             <a:extLst>
               <a:ext uri="{FF2B5EF4-FFF2-40B4-BE49-F238E27FC236}">
-                <a16:creationId xmlns:a16="http://schemas.microsoft.com/office/drawing/2014/main" id="{522B43B1-AC92-7A8A-A7F5-75323DBDD342}"/>
+                <a16:creationId xmlns:a16="http://schemas.microsoft.com/office/drawing/2014/main" id="{1967370F-990F-27D1-68A3-4334F4A0E925}"/>
               </a:ext>
             </a:extLst>
           </p:cNvPr>
@@ -11957,8 +11957,8 @@
         </p:blipFill>
         <p:spPr>
           <a:xfrm>
-            <a:off x="4974766" y="1863543"/>
-            <a:ext cx="5425776" cy="4298232"/>
+            <a:off x="5110268" y="1895626"/>
+            <a:ext cx="4917971" cy="4234066"/>
           </a:xfrm>
           <a:prstGeom prst="rect">
             <a:avLst/>

</xml_diff>